<commit_message>
Add dataset testing with DFW, and burn-in board images; Add burn-in test introduction;
</commit_message>
<xml_diff>
--- a/day4 Group CA proposal (GC) v 1.0.pptx
+++ b/day4 Group CA proposal (GC) v 1.0.pptx
@@ -5,25 +5,28 @@
     <p:sldMasterId id="2147483693" r:id="rId1"/>
   </p:sldMasterIdLst>
   <p:notesMasterIdLst>
-    <p:notesMasterId r:id="rId10"/>
+    <p:notesMasterId r:id="rId13"/>
   </p:notesMasterIdLst>
   <p:handoutMasterIdLst>
-    <p:handoutMasterId r:id="rId11"/>
+    <p:handoutMasterId r:id="rId14"/>
   </p:handoutMasterIdLst>
   <p:sldIdLst>
     <p:sldId id="328" r:id="rId2"/>
     <p:sldId id="329" r:id="rId3"/>
     <p:sldId id="330" r:id="rId4"/>
-    <p:sldId id="334" r:id="rId5"/>
-    <p:sldId id="332" r:id="rId6"/>
-    <p:sldId id="335" r:id="rId7"/>
-    <p:sldId id="331" r:id="rId8"/>
-    <p:sldId id="333" r:id="rId9"/>
+    <p:sldId id="338" r:id="rId5"/>
+    <p:sldId id="339" r:id="rId6"/>
+    <p:sldId id="334" r:id="rId7"/>
+    <p:sldId id="332" r:id="rId8"/>
+    <p:sldId id="335" r:id="rId9"/>
+    <p:sldId id="337" r:id="rId10"/>
+    <p:sldId id="331" r:id="rId11"/>
+    <p:sldId id="333" r:id="rId12"/>
   </p:sldIdLst>
   <p:sldSz cx="9144000" cy="6858000" type="screen4x3"/>
   <p:notesSz cx="6797675" cy="9926638"/>
   <p:custDataLst>
-    <p:tags r:id="rId12"/>
+    <p:tags r:id="rId15"/>
   </p:custDataLst>
   <p:defaultTextStyle>
     <a:defPPr>
@@ -225,7 +228,7 @@
             <a:fld id="{43F1A4C9-FB5C-B247-A357-650712A3F0A8}" type="datetimeFigureOut">
               <a:rPr lang="en-US" smtClean="0"/>
               <a:pPr/>
-              <a:t>10/14/2019</a:t>
+              <a:t>10/15/2019</a:t>
             </a:fld>
             <a:endParaRPr lang="en-US"/>
           </a:p>
@@ -392,7 +395,7 @@
             <a:fld id="{EA4960E5-F060-4C88-B1C5-5A6F5890BEF6}" type="datetimeFigureOut">
               <a:rPr lang="en-SG" smtClean="0"/>
               <a:pPr/>
-              <a:t>14/10/2019</a:t>
+              <a:t>15/10/2019</a:t>
             </a:fld>
             <a:endParaRPr lang="en-SG"/>
           </a:p>
@@ -3639,6 +3642,303 @@
 </p:sld>
 </file>
 
+<file path=ppt/slides/slide10.xml><?xml version="1.0" encoding="utf-8"?>
+<p:sld xmlns:a="http://schemas.openxmlformats.org/drawingml/2006/main" xmlns:r="http://schemas.openxmlformats.org/officeDocument/2006/relationships" xmlns:p="http://schemas.openxmlformats.org/presentationml/2006/main">
+  <p:cSld>
+    <p:spTree>
+      <p:nvGrpSpPr>
+        <p:cNvPr id="1" name=""/>
+        <p:cNvGrpSpPr/>
+        <p:nvPr/>
+      </p:nvGrpSpPr>
+      <p:grpSpPr>
+        <a:xfrm>
+          <a:off x="0" y="0"/>
+          <a:ext cx="0" cy="0"/>
+          <a:chOff x="0" y="0"/>
+          <a:chExt cx="0" cy="0"/>
+        </a:xfrm>
+      </p:grpSpPr>
+      <p:sp>
+        <p:nvSpPr>
+          <p:cNvPr id="2" name="Title 1"/>
+          <p:cNvSpPr>
+            <a:spLocks noGrp="1"/>
+          </p:cNvSpPr>
+          <p:nvPr>
+            <p:ph type="title"/>
+          </p:nvPr>
+        </p:nvSpPr>
+        <p:spPr/>
+        <p:txBody>
+          <a:bodyPr>
+            <a:normAutofit/>
+          </a:bodyPr>
+          <a:lstStyle/>
+          <a:p>
+            <a:r>
+              <a:rPr lang="en-US" dirty="0" smtClean="0"/>
+              <a:t>Proposed </a:t>
+            </a:r>
+            <a:r>
+              <a:rPr lang="en-US" dirty="0"/>
+              <a:t>A</a:t>
+            </a:r>
+            <a:r>
+              <a:rPr lang="en-US" dirty="0" smtClean="0"/>
+              <a:t>pproach</a:t>
+            </a:r>
+            <a:endParaRPr lang="en-SG" dirty="0"/>
+          </a:p>
+        </p:txBody>
+      </p:sp>
+      <p:sp>
+        <p:nvSpPr>
+          <p:cNvPr id="3" name="Text Placeholder 2"/>
+          <p:cNvSpPr>
+            <a:spLocks noGrp="1"/>
+          </p:cNvSpPr>
+          <p:nvPr>
+            <p:ph type="body" sz="quarter" idx="13"/>
+          </p:nvPr>
+        </p:nvSpPr>
+        <p:spPr/>
+        <p:txBody>
+          <a:bodyPr>
+            <a:normAutofit lnSpcReduction="10000"/>
+          </a:bodyPr>
+          <a:lstStyle/>
+          <a:p>
+            <a:r>
+              <a:rPr lang="en-US" dirty="0" smtClean="0"/>
+              <a:t>Implement unsupervised anomaly detection </a:t>
+            </a:r>
+            <a:r>
+              <a:rPr lang="en-US" dirty="0"/>
+              <a:t>on </a:t>
+            </a:r>
+            <a:r>
+              <a:rPr lang="en-US" dirty="0" smtClean="0"/>
+              <a:t>temperature time series data </a:t>
+            </a:r>
+            <a:endParaRPr lang="en-US" dirty="0"/>
+          </a:p>
+          <a:p>
+            <a:pPr lvl="1"/>
+            <a:r>
+              <a:rPr lang="en-US" dirty="0" smtClean="0"/>
+              <a:t>Temperature time series </a:t>
+            </a:r>
+            <a:r>
+              <a:rPr lang="en-US" dirty="0"/>
+              <a:t>data will be generated by </a:t>
+            </a:r>
+            <a:r>
+              <a:rPr lang="en-US" dirty="0" smtClean="0"/>
+              <a:t>sensor</a:t>
+            </a:r>
+          </a:p>
+          <a:p>
+            <a:pPr lvl="1"/>
+            <a:r>
+              <a:rPr lang="en-US" dirty="0" smtClean="0"/>
+              <a:t>Perform baseline correction on the time series</a:t>
+            </a:r>
+            <a:endParaRPr lang="en-US" dirty="0"/>
+          </a:p>
+          <a:p>
+            <a:pPr lvl="1"/>
+            <a:r>
+              <a:rPr lang="en-US" dirty="0"/>
+              <a:t>Train an auto-encoder on the training temperature data </a:t>
+            </a:r>
+          </a:p>
+          <a:p>
+            <a:pPr lvl="1"/>
+            <a:r>
+              <a:rPr lang="en-US" dirty="0"/>
+              <a:t>Evaluate it on the validation temperature data and the reconstructed error </a:t>
+            </a:r>
+            <a:r>
+              <a:rPr lang="en-US" dirty="0" smtClean="0"/>
+              <a:t>plot</a:t>
+            </a:r>
+          </a:p>
+          <a:p>
+            <a:pPr lvl="1"/>
+            <a:r>
+              <a:rPr lang="en-US" dirty="0" smtClean="0"/>
+              <a:t>Choose the threshold and determine the value is abnormal or not</a:t>
+            </a:r>
+          </a:p>
+          <a:p>
+            <a:pPr lvl="1"/>
+            <a:r>
+              <a:rPr lang="en-US" dirty="0" smtClean="0"/>
+              <a:t>Label chip as faulty if abnormal value is detected</a:t>
+            </a:r>
+            <a:endParaRPr lang="en-US" dirty="0"/>
+          </a:p>
+          <a:p>
+            <a:endParaRPr lang="en-SG" dirty="0"/>
+          </a:p>
+        </p:txBody>
+      </p:sp>
+      <p:sp>
+        <p:nvSpPr>
+          <p:cNvPr id="4" name="Slide Number Placeholder 3"/>
+          <p:cNvSpPr>
+            <a:spLocks noGrp="1"/>
+          </p:cNvSpPr>
+          <p:nvPr>
+            <p:ph type="sldNum" sz="quarter" idx="4"/>
+          </p:nvPr>
+        </p:nvSpPr>
+        <p:spPr/>
+        <p:txBody>
+          <a:bodyPr/>
+          <a:lstStyle/>
+          <a:p>
+            <a:r>
+              <a:rPr lang="en-SG" smtClean="0"/>
+              <a:t>Page </a:t>
+            </a:r>
+            <a:fld id="{2F63C605-4FC6-46DE-BC90-871762EA3F52}" type="slidenum">
+              <a:rPr lang="en-SG" smtClean="0"/>
+              <a:pPr/>
+              <a:t>10</a:t>
+            </a:fld>
+            <a:endParaRPr lang="en-SG" dirty="0"/>
+          </a:p>
+        </p:txBody>
+      </p:sp>
+    </p:spTree>
+    <p:extLst>
+      <p:ext uri="{BB962C8B-B14F-4D97-AF65-F5344CB8AC3E}">
+        <p14:creationId xmlns:p14="http://schemas.microsoft.com/office/powerpoint/2010/main" val="2796628514"/>
+      </p:ext>
+    </p:extLst>
+  </p:cSld>
+  <p:clrMapOvr>
+    <a:masterClrMapping/>
+  </p:clrMapOvr>
+  <p:timing>
+    <p:tnLst>
+      <p:par>
+        <p:cTn id="1" dur="indefinite" restart="never" nodeType="tmRoot"/>
+      </p:par>
+    </p:tnLst>
+  </p:timing>
+</p:sld>
+</file>
+
+<file path=ppt/slides/slide11.xml><?xml version="1.0" encoding="utf-8"?>
+<p:sld xmlns:a="http://schemas.openxmlformats.org/drawingml/2006/main" xmlns:r="http://schemas.openxmlformats.org/officeDocument/2006/relationships" xmlns:p="http://schemas.openxmlformats.org/presentationml/2006/main">
+  <p:cSld>
+    <p:spTree>
+      <p:nvGrpSpPr>
+        <p:cNvPr id="1" name=""/>
+        <p:cNvGrpSpPr/>
+        <p:nvPr/>
+      </p:nvGrpSpPr>
+      <p:grpSpPr>
+        <a:xfrm>
+          <a:off x="0" y="0"/>
+          <a:ext cx="0" cy="0"/>
+          <a:chOff x="0" y="0"/>
+          <a:chExt cx="0" cy="0"/>
+        </a:xfrm>
+      </p:grpSpPr>
+      <p:sp>
+        <p:nvSpPr>
+          <p:cNvPr id="2" name="Title 1"/>
+          <p:cNvSpPr>
+            <a:spLocks noGrp="1"/>
+          </p:cNvSpPr>
+          <p:nvPr>
+            <p:ph type="title"/>
+          </p:nvPr>
+        </p:nvSpPr>
+        <p:spPr/>
+        <p:txBody>
+          <a:bodyPr/>
+          <a:lstStyle/>
+          <a:p>
+            <a:r>
+              <a:rPr lang="en-US" dirty="0" smtClean="0"/>
+              <a:t>Any other additional comment</a:t>
+            </a:r>
+            <a:endParaRPr lang="en-SG" dirty="0"/>
+          </a:p>
+        </p:txBody>
+      </p:sp>
+      <p:sp>
+        <p:nvSpPr>
+          <p:cNvPr id="3" name="Text Placeholder 2"/>
+          <p:cNvSpPr>
+            <a:spLocks noGrp="1"/>
+          </p:cNvSpPr>
+          <p:nvPr>
+            <p:ph type="body" sz="quarter" idx="13"/>
+          </p:nvPr>
+        </p:nvSpPr>
+        <p:spPr/>
+        <p:txBody>
+          <a:bodyPr/>
+          <a:lstStyle/>
+          <a:p>
+            <a:endParaRPr lang="en-SG" dirty="0"/>
+          </a:p>
+        </p:txBody>
+      </p:sp>
+      <p:sp>
+        <p:nvSpPr>
+          <p:cNvPr id="4" name="Slide Number Placeholder 3"/>
+          <p:cNvSpPr>
+            <a:spLocks noGrp="1"/>
+          </p:cNvSpPr>
+          <p:nvPr>
+            <p:ph type="sldNum" sz="quarter" idx="4"/>
+          </p:nvPr>
+        </p:nvSpPr>
+        <p:spPr/>
+        <p:txBody>
+          <a:bodyPr/>
+          <a:lstStyle/>
+          <a:p>
+            <a:r>
+              <a:rPr lang="en-SG" smtClean="0"/>
+              <a:t>Page </a:t>
+            </a:r>
+            <a:fld id="{2F63C605-4FC6-46DE-BC90-871762EA3F52}" type="slidenum">
+              <a:rPr lang="en-SG" smtClean="0"/>
+              <a:pPr/>
+              <a:t>11</a:t>
+            </a:fld>
+            <a:endParaRPr lang="en-SG" dirty="0"/>
+          </a:p>
+        </p:txBody>
+      </p:sp>
+    </p:spTree>
+    <p:extLst>
+      <p:ext uri="{BB962C8B-B14F-4D97-AF65-F5344CB8AC3E}">
+        <p14:creationId xmlns:p14="http://schemas.microsoft.com/office/powerpoint/2010/main" val="4199355543"/>
+      </p:ext>
+    </p:extLst>
+  </p:cSld>
+  <p:clrMapOvr>
+    <a:masterClrMapping/>
+  </p:clrMapOvr>
+  <p:timing>
+    <p:tnLst>
+      <p:par>
+        <p:cTn id="1" dur="indefinite" restart="never" nodeType="tmRoot"/>
+      </p:par>
+    </p:tnLst>
+  </p:timing>
+</p:sld>
+</file>
+
 <file path=ppt/slides/slide2.xml><?xml version="1.0" encoding="utf-8"?>
 <p:sld xmlns:a="http://schemas.openxmlformats.org/drawingml/2006/main" xmlns:r="http://schemas.openxmlformats.org/officeDocument/2006/relationships" xmlns:p="http://schemas.openxmlformats.org/presentationml/2006/main">
   <p:cSld>
@@ -3815,7 +4115,23 @@
           <a:p>
             <a:r>
               <a:rPr lang="en-US" dirty="0"/>
-              <a:t>During oven testing, the heat will be generated at the burn-in board, and the temperature of chip on the burn-in board </a:t>
+              <a:t>During </a:t>
+            </a:r>
+            <a:r>
+              <a:rPr lang="en-US" dirty="0" smtClean="0"/>
+              <a:t>burn-in </a:t>
+            </a:r>
+            <a:r>
+              <a:rPr lang="en-US" dirty="0"/>
+              <a:t>testing, the heat will be generated at the </a:t>
+            </a:r>
+            <a:r>
+              <a:rPr lang="en-US" dirty="0" smtClean="0"/>
+              <a:t>burn-in </a:t>
+            </a:r>
+            <a:r>
+              <a:rPr lang="en-US" dirty="0"/>
+              <a:t>board, and the temperature of chip on the burn-in board </a:t>
             </a:r>
             <a:r>
               <a:rPr lang="en-US" dirty="0" smtClean="0"/>
@@ -3936,6 +4252,29 @@
         </p:nvSpPr>
         <p:spPr/>
         <p:txBody>
+          <a:bodyPr/>
+          <a:lstStyle/>
+          <a:p>
+            <a:r>
+              <a:rPr lang="en-US" dirty="0" smtClean="0"/>
+              <a:t>Burn-In Test</a:t>
+            </a:r>
+            <a:endParaRPr lang="en-SG" dirty="0"/>
+          </a:p>
+        </p:txBody>
+      </p:sp>
+      <p:sp>
+        <p:nvSpPr>
+          <p:cNvPr id="3" name="Text Placeholder 2"/>
+          <p:cNvSpPr>
+            <a:spLocks noGrp="1"/>
+          </p:cNvSpPr>
+          <p:nvPr>
+            <p:ph type="body" sz="quarter" idx="13"/>
+          </p:nvPr>
+        </p:nvSpPr>
+        <p:spPr/>
+        <p:txBody>
           <a:bodyPr>
             <a:normAutofit/>
           </a:bodyPr>
@@ -3943,52 +4282,49 @@
           <a:p>
             <a:r>
               <a:rPr lang="en-SG" dirty="0" smtClean="0"/>
-              <a:t>Technical objective</a:t>
-            </a:r>
-            <a:endParaRPr lang="en-SG" dirty="0"/>
-          </a:p>
-        </p:txBody>
-      </p:sp>
-      <p:sp>
-        <p:nvSpPr>
-          <p:cNvPr id="3" name="Text Placeholder 2"/>
-          <p:cNvSpPr>
-            <a:spLocks noGrp="1"/>
-          </p:cNvSpPr>
-          <p:nvPr>
-            <p:ph type="body" sz="quarter" idx="13"/>
-          </p:nvPr>
-        </p:nvSpPr>
-        <p:spPr/>
-        <p:txBody>
-          <a:bodyPr/>
-          <a:lstStyle/>
-          <a:p>
-            <a:r>
-              <a:rPr lang="en-US" dirty="0" smtClean="0"/>
-              <a:t>Create model to perform unsupervised </a:t>
-            </a:r>
-            <a:r>
-              <a:rPr lang="en-US" dirty="0"/>
-              <a:t>a</a:t>
-            </a:r>
-            <a:r>
-              <a:rPr lang="en-US" dirty="0" smtClean="0"/>
-              <a:t>nomaly detection on temperature </a:t>
-            </a:r>
-            <a:r>
-              <a:rPr lang="en-US" dirty="0"/>
-              <a:t>d</a:t>
-            </a:r>
-            <a:r>
-              <a:rPr lang="en-US" dirty="0" smtClean="0"/>
-              <a:t>ata  </a:t>
-            </a:r>
-          </a:p>
-          <a:p>
-            <a:r>
-              <a:rPr lang="en-US" dirty="0" smtClean="0"/>
-              <a:t>Label chip as normal or faulty based on model output</a:t>
+              <a:t>Burn-in </a:t>
+            </a:r>
+            <a:r>
+              <a:rPr lang="en-SG" dirty="0"/>
+              <a:t>Test</a:t>
+            </a:r>
+          </a:p>
+          <a:p>
+            <a:pPr lvl="1"/>
+            <a:r>
+              <a:rPr lang="en-SG" dirty="0" smtClean="0"/>
+              <a:t>Check </a:t>
+            </a:r>
+            <a:r>
+              <a:rPr lang="en-SG" dirty="0"/>
+              <a:t>the reliability of </a:t>
+            </a:r>
+            <a:r>
+              <a:rPr lang="en-SG" dirty="0" smtClean="0"/>
+              <a:t>chips</a:t>
+            </a:r>
+          </a:p>
+          <a:p>
+            <a:pPr lvl="1"/>
+            <a:r>
+              <a:rPr lang="en-SG" dirty="0" smtClean="0"/>
+              <a:t>Burn-in </a:t>
+            </a:r>
+            <a:r>
+              <a:rPr lang="en-SG" dirty="0"/>
+              <a:t>boards are inserted into the burn-in oven </a:t>
+            </a:r>
+            <a:r>
+              <a:rPr lang="en-SG" dirty="0" smtClean="0"/>
+              <a:t>which </a:t>
+            </a:r>
+            <a:r>
+              <a:rPr lang="en-SG" dirty="0"/>
+              <a:t>supplies the necessary voltages to the samples while maintaining the oven </a:t>
+            </a:r>
+            <a:r>
+              <a:rPr lang="en-SG" dirty="0" smtClean="0"/>
+              <a:t>temperature</a:t>
             </a:r>
           </a:p>
           <a:p>
@@ -4028,7 +4364,7 @@
     </p:spTree>
     <p:extLst>
       <p:ext uri="{BB962C8B-B14F-4D97-AF65-F5344CB8AC3E}">
-        <p14:creationId xmlns:p14="http://schemas.microsoft.com/office/powerpoint/2010/main" val="3814157071"/>
+        <p14:creationId xmlns:p14="http://schemas.microsoft.com/office/powerpoint/2010/main" val="1966461947"/>
       </p:ext>
     </p:extLst>
   </p:cSld>
@@ -4067,14 +4403,12 @@
         </p:nvSpPr>
         <p:spPr/>
         <p:txBody>
-          <a:bodyPr>
-            <a:normAutofit/>
-          </a:bodyPr>
+          <a:bodyPr/>
           <a:lstStyle/>
           <a:p>
             <a:r>
               <a:rPr lang="en-US" dirty="0" smtClean="0"/>
-              <a:t>Resources</a:t>
+              <a:t>Burn-In Board</a:t>
             </a:r>
             <a:endParaRPr lang="en-SG" dirty="0"/>
           </a:p>
@@ -4092,74 +4426,27 @@
         </p:nvSpPr>
         <p:spPr/>
         <p:txBody>
-          <a:bodyPr>
-            <a:normAutofit fontScale="92500" lnSpcReduction="10000"/>
-          </a:bodyPr>
+          <a:bodyPr/>
           <a:lstStyle/>
           <a:p>
             <a:r>
-              <a:rPr lang="en-SG" dirty="0" smtClean="0"/>
-              <a:t>Dataset</a:t>
+              <a:rPr lang="en-SG" dirty="0"/>
+              <a:t>Burn-in Board</a:t>
             </a:r>
           </a:p>
           <a:p>
             <a:pPr lvl="1"/>
             <a:r>
-              <a:rPr lang="en-US" dirty="0" smtClean="0"/>
-              <a:t>Masked data based on the original data </a:t>
-            </a:r>
-            <a:r>
-              <a:rPr lang="en-SG" dirty="0" smtClean="0"/>
-              <a:t>from </a:t>
-            </a:r>
-            <a:r>
               <a:rPr lang="en-SG" dirty="0"/>
-              <a:t>semi-conductor factory</a:t>
-            </a:r>
-            <a:endParaRPr lang="en-SG" dirty="0" smtClean="0"/>
+              <a:t>It is used as part of the reliability testing process during which components are stressed to detect failures</a:t>
+            </a:r>
           </a:p>
           <a:p>
             <a:pPr lvl="1"/>
             <a:r>
-              <a:rPr lang="en-US" dirty="0" smtClean="0"/>
-              <a:t>Contains sensor temperature data inside IC chip</a:t>
-            </a:r>
-          </a:p>
-          <a:p>
-            <a:pPr lvl="1"/>
-            <a:r>
-              <a:rPr lang="en-US" dirty="0" smtClean="0"/>
-              <a:t>Obtained during oven testing interval under similar testing environment</a:t>
-            </a:r>
-          </a:p>
-          <a:p>
-            <a:pPr lvl="1"/>
-            <a:r>
-              <a:rPr lang="en-US" dirty="0" smtClean="0"/>
-              <a:t>Contains 400 burn-in board, and each board contains 32 x 20 chips</a:t>
-            </a:r>
-          </a:p>
-          <a:p>
-            <a:pPr lvl="1"/>
-            <a:r>
-              <a:rPr lang="en-US" dirty="0" smtClean="0"/>
-              <a:t>Each chip has 20 temperature reading in 10 minutes interval</a:t>
-            </a:r>
-            <a:endParaRPr lang="en-SG" dirty="0" smtClean="0"/>
-          </a:p>
-          <a:p>
-            <a:endParaRPr lang="en-SG" dirty="0" smtClean="0"/>
-          </a:p>
-          <a:p>
-            <a:r>
-              <a:rPr lang="en-SG" dirty="0" smtClean="0"/>
-              <a:t>Reference </a:t>
-            </a:r>
-            <a:r>
-              <a:rPr lang="en-SG" dirty="0" smtClean="0"/>
-              <a:t>code</a:t>
-            </a:r>
-            <a:endParaRPr lang="en-SG" dirty="0"/>
+              <a:rPr lang="en-SG" dirty="0"/>
+              <a:t>It consist of sockets to accommodate the tested chips and are designed to withstand the hot temperatures during tests</a:t>
+            </a:r>
           </a:p>
         </p:txBody>
       </p:sp>
@@ -4191,23 +4478,40 @@
           </a:p>
         </p:txBody>
       </p:sp>
+      <p:pic>
+        <p:nvPicPr>
+          <p:cNvPr id="5" name="Picture 4"/>
+          <p:cNvPicPr>
+            <a:picLocks noChangeAspect="1"/>
+          </p:cNvPicPr>
+          <p:nvPr/>
+        </p:nvPicPr>
+        <p:blipFill>
+          <a:blip r:embed="rId2"/>
+          <a:stretch>
+            <a:fillRect/>
+          </a:stretch>
+        </p:blipFill>
+        <p:spPr>
+          <a:xfrm>
+            <a:off x="1367463" y="3899833"/>
+            <a:ext cx="6631228" cy="1781204"/>
+          </a:xfrm>
+          <a:prstGeom prst="rect">
+            <a:avLst/>
+          </a:prstGeom>
+        </p:spPr>
+      </p:pic>
     </p:spTree>
     <p:extLst>
       <p:ext uri="{BB962C8B-B14F-4D97-AF65-F5344CB8AC3E}">
-        <p14:creationId xmlns:p14="http://schemas.microsoft.com/office/powerpoint/2010/main" val="2225590141"/>
+        <p14:creationId xmlns:p14="http://schemas.microsoft.com/office/powerpoint/2010/main" val="4068297518"/>
       </p:ext>
     </p:extLst>
   </p:cSld>
   <p:clrMapOvr>
     <a:masterClrMapping/>
   </p:clrMapOvr>
-  <p:timing>
-    <p:tnLst>
-      <p:par>
-        <p:cTn id="1" dur="indefinite" restart="never" nodeType="tmRoot"/>
-      </p:par>
-    </p:tnLst>
-  </p:timing>
 </p:sld>
 </file>
 
@@ -4246,8 +4550,8 @@
           <a:lstStyle/>
           <a:p>
             <a:r>
-              <a:rPr lang="en-US" dirty="0" smtClean="0"/>
-              <a:t>Resources</a:t>
+              <a:rPr lang="en-SG" dirty="0" smtClean="0"/>
+              <a:t>Technical objective</a:t>
             </a:r>
             <a:endParaRPr lang="en-SG" dirty="0"/>
           </a:p>
@@ -4265,18 +4569,39 @@
         </p:nvSpPr>
         <p:spPr/>
         <p:txBody>
-          <a:bodyPr>
-            <a:normAutofit/>
-          </a:bodyPr>
+          <a:bodyPr/>
           <a:lstStyle/>
           <a:p>
             <a:r>
-              <a:rPr lang="en-SG" dirty="0" smtClean="0"/>
-              <a:t>Dataset</a:t>
-            </a:r>
-          </a:p>
-          <a:p>
-            <a:endParaRPr lang="en-SG" dirty="0" smtClean="0"/>
+              <a:rPr lang="en-US" dirty="0" smtClean="0"/>
+              <a:t>Create model to perform unsupervised </a:t>
+            </a:r>
+            <a:r>
+              <a:rPr lang="en-US" dirty="0"/>
+              <a:t>a</a:t>
+            </a:r>
+            <a:r>
+              <a:rPr lang="en-US" dirty="0" smtClean="0"/>
+              <a:t>nomaly detection on temperature </a:t>
+            </a:r>
+            <a:r>
+              <a:rPr lang="en-US" dirty="0"/>
+              <a:t>d</a:t>
+            </a:r>
+            <a:r>
+              <a:rPr lang="en-US" dirty="0" smtClean="0"/>
+              <a:t>ata  </a:t>
+            </a:r>
+          </a:p>
+          <a:p>
+            <a:r>
+              <a:rPr lang="en-US" dirty="0" smtClean="0"/>
+              <a:t>Label chip as normal or faulty based on model output</a:t>
+            </a:r>
+          </a:p>
+          <a:p>
+            <a:pPr lvl="1"/>
+            <a:endParaRPr lang="en-SG" dirty="0"/>
           </a:p>
         </p:txBody>
       </p:sp>
@@ -4308,46 +4633,16 @@
           </a:p>
         </p:txBody>
       </p:sp>
-      <p:pic>
-        <p:nvPicPr>
-          <p:cNvPr id="7" name="Picture 6"/>
-          <p:cNvPicPr>
-            <a:picLocks noChangeAspect="1"/>
-          </p:cNvPicPr>
-          <p:nvPr/>
-        </p:nvPicPr>
-        <p:blipFill rotWithShape="1">
-          <a:blip r:embed="rId2"/>
-          <a:srcRect t="3768"/>
-          <a:stretch/>
-        </p:blipFill>
-        <p:spPr>
-          <a:xfrm>
-            <a:off x="833716" y="1978864"/>
-            <a:ext cx="7378855" cy="2485560"/>
-          </a:xfrm>
-          <a:prstGeom prst="rect">
-            <a:avLst/>
-          </a:prstGeom>
-        </p:spPr>
-      </p:pic>
     </p:spTree>
     <p:extLst>
       <p:ext uri="{BB962C8B-B14F-4D97-AF65-F5344CB8AC3E}">
-        <p14:creationId xmlns:p14="http://schemas.microsoft.com/office/powerpoint/2010/main" val="2276034300"/>
+        <p14:creationId xmlns:p14="http://schemas.microsoft.com/office/powerpoint/2010/main" val="3814157071"/>
       </p:ext>
     </p:extLst>
   </p:cSld>
   <p:clrMapOvr>
     <a:masterClrMapping/>
   </p:clrMapOvr>
-  <p:timing>
-    <p:tnLst>
-      <p:par>
-        <p:cTn id="1" dur="indefinite" restart="never" nodeType="tmRoot"/>
-      </p:par>
-    </p:tnLst>
-  </p:timing>
 </p:sld>
 </file>
 
@@ -4387,15 +4682,7 @@
           <a:p>
             <a:r>
               <a:rPr lang="en-US" dirty="0" smtClean="0"/>
-              <a:t>Proposed </a:t>
-            </a:r>
-            <a:r>
-              <a:rPr lang="en-US" dirty="0"/>
-              <a:t>A</a:t>
-            </a:r>
-            <a:r>
-              <a:rPr lang="en-US" dirty="0" smtClean="0"/>
-              <a:t>pproach</a:t>
+              <a:t>Resources</a:t>
             </a:r>
             <a:endParaRPr lang="en-SG" dirty="0"/>
           </a:p>
@@ -4413,69 +4700,71 @@
         </p:nvSpPr>
         <p:spPr/>
         <p:txBody>
-          <a:bodyPr/>
+          <a:bodyPr>
+            <a:normAutofit/>
+          </a:bodyPr>
           <a:lstStyle/>
           <a:p>
             <a:r>
-              <a:rPr lang="en-US" dirty="0" smtClean="0"/>
-              <a:t>Implement unsupervised anomaly detection </a:t>
-            </a:r>
-            <a:r>
-              <a:rPr lang="en-US" dirty="0"/>
-              <a:t>on </a:t>
-            </a:r>
-            <a:r>
-              <a:rPr lang="en-US" dirty="0" smtClean="0"/>
-              <a:t>temperature time series data </a:t>
-            </a:r>
-            <a:endParaRPr lang="en-US" dirty="0"/>
+              <a:rPr lang="en-SG" dirty="0" smtClean="0"/>
+              <a:t>Dataset</a:t>
+            </a:r>
           </a:p>
           <a:p>
             <a:pPr lvl="1"/>
             <a:r>
               <a:rPr lang="en-US" dirty="0" smtClean="0"/>
-              <a:t>Temperature time series </a:t>
-            </a:r>
-            <a:r>
-              <a:rPr lang="en-US" dirty="0"/>
-              <a:t>data will be generated by sensor</a:t>
-            </a:r>
+              <a:t>Masked data based on the original data </a:t>
+            </a:r>
+            <a:r>
+              <a:rPr lang="en-SG" dirty="0" smtClean="0"/>
+              <a:t>from </a:t>
+            </a:r>
+            <a:r>
+              <a:rPr lang="en-SG" dirty="0"/>
+              <a:t>semi-conductor factory</a:t>
+            </a:r>
+            <a:endParaRPr lang="en-SG" dirty="0" smtClean="0"/>
           </a:p>
           <a:p>
             <a:pPr lvl="1"/>
             <a:r>
-              <a:rPr lang="en-US" dirty="0"/>
-              <a:t>Train an auto-encoder on the training temperature data </a:t>
+              <a:rPr lang="en-US" dirty="0" smtClean="0"/>
+              <a:t>Contains sensor temperature data inside IC chip</a:t>
             </a:r>
           </a:p>
           <a:p>
             <a:pPr lvl="1"/>
             <a:r>
-              <a:rPr lang="en-US" dirty="0"/>
-              <a:t>Evaluate it on the validation temperature data and the reconstructed error </a:t>
-            </a:r>
-            <a:r>
-              <a:rPr lang="en-US" dirty="0" smtClean="0"/>
-              <a:t>plot</a:t>
+              <a:rPr lang="en-US" dirty="0" smtClean="0"/>
+              <a:t>Obtained during </a:t>
+            </a:r>
+            <a:r>
+              <a:rPr lang="en-US" dirty="0" smtClean="0"/>
+              <a:t>burn-in test interval </a:t>
+            </a:r>
+            <a:r>
+              <a:rPr lang="en-US" dirty="0" smtClean="0"/>
+              <a:t>under similar testing environment</a:t>
             </a:r>
           </a:p>
           <a:p>
             <a:pPr lvl="1"/>
             <a:r>
               <a:rPr lang="en-US" dirty="0" smtClean="0"/>
-              <a:t>Choose the threshold and determine the value is abnormal or not</a:t>
+              <a:t>Contains 400 burn-in board, and each board contains 32 x 20 chips</a:t>
             </a:r>
           </a:p>
           <a:p>
             <a:pPr lvl="1"/>
             <a:r>
               <a:rPr lang="en-US" dirty="0" smtClean="0"/>
-              <a:t>Label chip as faulty if abnormal value is detected</a:t>
-            </a:r>
-            <a:endParaRPr lang="en-US" dirty="0"/>
-          </a:p>
-          <a:p>
-            <a:endParaRPr lang="en-SG" dirty="0"/>
+              <a:t>Each chip has 20 temperature reading in 10 minutes interval</a:t>
+            </a:r>
+            <a:endParaRPr lang="en-SG" dirty="0" smtClean="0"/>
+          </a:p>
+          <a:p>
+            <a:endParaRPr lang="en-SG" dirty="0" smtClean="0"/>
           </a:p>
         </p:txBody>
       </p:sp>
@@ -4510,7 +4799,7 @@
     </p:spTree>
     <p:extLst>
       <p:ext uri="{BB962C8B-B14F-4D97-AF65-F5344CB8AC3E}">
-        <p14:creationId xmlns:p14="http://schemas.microsoft.com/office/powerpoint/2010/main" val="2796628514"/>
+        <p14:creationId xmlns:p14="http://schemas.microsoft.com/office/powerpoint/2010/main" val="2225590141"/>
       </p:ext>
     </p:extLst>
   </p:cSld>
@@ -4556,12 +4845,14 @@
         </p:nvSpPr>
         <p:spPr/>
         <p:txBody>
-          <a:bodyPr/>
+          <a:bodyPr>
+            <a:normAutofit/>
+          </a:bodyPr>
           <a:lstStyle/>
           <a:p>
             <a:r>
               <a:rPr lang="en-US" dirty="0" smtClean="0"/>
-              <a:t>Any other additional comment</a:t>
+              <a:t>Resources</a:t>
             </a:r>
             <a:endParaRPr lang="en-SG" dirty="0"/>
           </a:p>
@@ -4579,10 +4870,18 @@
         </p:nvSpPr>
         <p:spPr/>
         <p:txBody>
-          <a:bodyPr/>
+          <a:bodyPr>
+            <a:normAutofit/>
+          </a:bodyPr>
           <a:lstStyle/>
           <a:p>
-            <a:endParaRPr lang="en-SG" dirty="0"/>
+            <a:r>
+              <a:rPr lang="en-SG" dirty="0" smtClean="0"/>
+              <a:t>Dataset</a:t>
+            </a:r>
+          </a:p>
+          <a:p>
+            <a:endParaRPr lang="en-SG" dirty="0" smtClean="0"/>
           </a:p>
         </p:txBody>
       </p:sp>
@@ -4614,10 +4913,34 @@
           </a:p>
         </p:txBody>
       </p:sp>
+      <p:pic>
+        <p:nvPicPr>
+          <p:cNvPr id="5" name="Picture 4"/>
+          <p:cNvPicPr>
+            <a:picLocks noChangeAspect="1"/>
+          </p:cNvPicPr>
+          <p:nvPr/>
+        </p:nvPicPr>
+        <p:blipFill>
+          <a:blip r:embed="rId2"/>
+          <a:stretch>
+            <a:fillRect/>
+          </a:stretch>
+        </p:blipFill>
+        <p:spPr>
+          <a:xfrm>
+            <a:off x="908349" y="1853747"/>
+            <a:ext cx="7648855" cy="2578404"/>
+          </a:xfrm>
+          <a:prstGeom prst="rect">
+            <a:avLst/>
+          </a:prstGeom>
+        </p:spPr>
+      </p:pic>
     </p:spTree>
     <p:extLst>
       <p:ext uri="{BB962C8B-B14F-4D97-AF65-F5344CB8AC3E}">
-        <p14:creationId xmlns:p14="http://schemas.microsoft.com/office/powerpoint/2010/main" val="4199355543"/>
+        <p14:creationId xmlns:p14="http://schemas.microsoft.com/office/powerpoint/2010/main" val="2276034300"/>
       </p:ext>
     </p:extLst>
   </p:cSld>
@@ -4631,6 +4954,132 @@
       </p:par>
     </p:tnLst>
   </p:timing>
+</p:sld>
+</file>
+
+<file path=ppt/slides/slide9.xml><?xml version="1.0" encoding="utf-8"?>
+<p:sld xmlns:a="http://schemas.openxmlformats.org/drawingml/2006/main" xmlns:r="http://schemas.openxmlformats.org/officeDocument/2006/relationships" xmlns:p="http://schemas.openxmlformats.org/presentationml/2006/main">
+  <p:cSld>
+    <p:spTree>
+      <p:nvGrpSpPr>
+        <p:cNvPr id="1" name=""/>
+        <p:cNvGrpSpPr/>
+        <p:nvPr/>
+      </p:nvGrpSpPr>
+      <p:grpSpPr>
+        <a:xfrm>
+          <a:off x="0" y="0"/>
+          <a:ext cx="0" cy="0"/>
+          <a:chOff x="0" y="0"/>
+          <a:chExt cx="0" cy="0"/>
+        </a:xfrm>
+      </p:grpSpPr>
+      <p:sp>
+        <p:nvSpPr>
+          <p:cNvPr id="2" name="Title 1"/>
+          <p:cNvSpPr>
+            <a:spLocks noGrp="1"/>
+          </p:cNvSpPr>
+          <p:nvPr>
+            <p:ph type="title"/>
+          </p:nvPr>
+        </p:nvSpPr>
+        <p:spPr/>
+        <p:txBody>
+          <a:bodyPr/>
+          <a:lstStyle/>
+          <a:p>
+            <a:endParaRPr lang="en-SG"/>
+          </a:p>
+        </p:txBody>
+      </p:sp>
+      <p:sp>
+        <p:nvSpPr>
+          <p:cNvPr id="3" name="Text Placeholder 2"/>
+          <p:cNvSpPr>
+            <a:spLocks noGrp="1"/>
+          </p:cNvSpPr>
+          <p:nvPr>
+            <p:ph type="body" sz="quarter" idx="13"/>
+          </p:nvPr>
+        </p:nvSpPr>
+        <p:spPr/>
+        <p:txBody>
+          <a:bodyPr/>
+          <a:lstStyle/>
+          <a:p>
+            <a:r>
+              <a:rPr lang="en-US" dirty="0" smtClean="0"/>
+              <a:t>Dataset</a:t>
+            </a:r>
+          </a:p>
+          <a:p>
+            <a:endParaRPr lang="en-SG" dirty="0"/>
+          </a:p>
+        </p:txBody>
+      </p:sp>
+      <p:sp>
+        <p:nvSpPr>
+          <p:cNvPr id="4" name="Slide Number Placeholder 3"/>
+          <p:cNvSpPr>
+            <a:spLocks noGrp="1"/>
+          </p:cNvSpPr>
+          <p:nvPr>
+            <p:ph type="sldNum" sz="quarter" idx="4"/>
+          </p:nvPr>
+        </p:nvSpPr>
+        <p:spPr/>
+        <p:txBody>
+          <a:bodyPr/>
+          <a:lstStyle/>
+          <a:p>
+            <a:r>
+              <a:rPr lang="en-SG" smtClean="0"/>
+              <a:t>Page </a:t>
+            </a:r>
+            <a:fld id="{2F63C605-4FC6-46DE-BC90-871762EA3F52}" type="slidenum">
+              <a:rPr lang="en-SG" smtClean="0"/>
+              <a:pPr/>
+              <a:t>9</a:t>
+            </a:fld>
+            <a:endParaRPr lang="en-SG" dirty="0"/>
+          </a:p>
+        </p:txBody>
+      </p:sp>
+      <p:pic>
+        <p:nvPicPr>
+          <p:cNvPr id="5" name="Picture 4"/>
+          <p:cNvPicPr>
+            <a:picLocks noChangeAspect="1"/>
+          </p:cNvPicPr>
+          <p:nvPr/>
+        </p:nvPicPr>
+        <p:blipFill>
+          <a:blip r:embed="rId2"/>
+          <a:stretch>
+            <a:fillRect/>
+          </a:stretch>
+        </p:blipFill>
+        <p:spPr>
+          <a:xfrm>
+            <a:off x="933786" y="1949353"/>
+            <a:ext cx="7581564" cy="2578721"/>
+          </a:xfrm>
+          <a:prstGeom prst="rect">
+            <a:avLst/>
+          </a:prstGeom>
+        </p:spPr>
+      </p:pic>
+    </p:spTree>
+    <p:extLst>
+      <p:ext uri="{BB962C8B-B14F-4D97-AF65-F5344CB8AC3E}">
+        <p14:creationId xmlns:p14="http://schemas.microsoft.com/office/powerpoint/2010/main" val="2096090939"/>
+      </p:ext>
+    </p:extLst>
+  </p:cSld>
+  <p:clrMapOvr>
+    <a:masterClrMapping/>
+  </p:clrMapOvr>
 </p:sld>
 </file>
 

</xml_diff>

<commit_message>
Improve application to show burn in board and update ppt;
</commit_message>
<xml_diff>
--- a/day4 Group CA proposal (GC) v 1.0.pptx
+++ b/day4 Group CA proposal (GC) v 1.0.pptx
@@ -5,10 +5,10 @@
     <p:sldMasterId id="2147483693" r:id="rId1"/>
   </p:sldMasterIdLst>
   <p:notesMasterIdLst>
-    <p:notesMasterId r:id="rId13"/>
+    <p:notesMasterId r:id="rId14"/>
   </p:notesMasterIdLst>
   <p:handoutMasterIdLst>
-    <p:handoutMasterId r:id="rId14"/>
+    <p:handoutMasterId r:id="rId15"/>
   </p:handoutMasterIdLst>
   <p:sldIdLst>
     <p:sldId id="328" r:id="rId2"/>
@@ -20,13 +20,14 @@
     <p:sldId id="332" r:id="rId8"/>
     <p:sldId id="335" r:id="rId9"/>
     <p:sldId id="337" r:id="rId10"/>
-    <p:sldId id="331" r:id="rId11"/>
-    <p:sldId id="333" r:id="rId12"/>
+    <p:sldId id="340" r:id="rId11"/>
+    <p:sldId id="331" r:id="rId12"/>
+    <p:sldId id="333" r:id="rId13"/>
   </p:sldIdLst>
   <p:sldSz cx="9144000" cy="6858000" type="screen4x3"/>
   <p:notesSz cx="6797675" cy="9926638"/>
   <p:custDataLst>
-    <p:tags r:id="rId15"/>
+    <p:tags r:id="rId16"/>
   </p:custDataLst>
   <p:defaultTextStyle>
     <a:defPPr>
@@ -228,7 +229,7 @@
             <a:fld id="{43F1A4C9-FB5C-B247-A357-650712A3F0A8}" type="datetimeFigureOut">
               <a:rPr lang="en-US" smtClean="0"/>
               <a:pPr/>
-              <a:t>10/15/2019</a:t>
+              <a:t>10/16/2019</a:t>
             </a:fld>
             <a:endParaRPr lang="en-US"/>
           </a:p>
@@ -395,7 +396,7 @@
             <a:fld id="{EA4960E5-F060-4C88-B1C5-5A6F5890BEF6}" type="datetimeFigureOut">
               <a:rPr lang="en-SG" smtClean="0"/>
               <a:pPr/>
-              <a:t>15/10/2019</a:t>
+              <a:t>16/10/2019</a:t>
             </a:fld>
             <a:endParaRPr lang="en-SG"/>
           </a:p>
@@ -3671,6 +3672,136 @@
         </p:nvSpPr>
         <p:spPr/>
         <p:txBody>
+          <a:bodyPr/>
+          <a:lstStyle/>
+          <a:p>
+            <a:r>
+              <a:rPr lang="en-US" dirty="0" smtClean="0"/>
+              <a:t>Resource</a:t>
+            </a:r>
+            <a:endParaRPr lang="en-SG" dirty="0"/>
+          </a:p>
+        </p:txBody>
+      </p:sp>
+      <p:sp>
+        <p:nvSpPr>
+          <p:cNvPr id="3" name="Text Placeholder 2"/>
+          <p:cNvSpPr>
+            <a:spLocks noGrp="1"/>
+          </p:cNvSpPr>
+          <p:nvPr>
+            <p:ph type="body" sz="quarter" idx="13"/>
+          </p:nvPr>
+        </p:nvSpPr>
+        <p:spPr/>
+        <p:txBody>
+          <a:bodyPr/>
+          <a:lstStyle/>
+          <a:p>
+            <a:r>
+              <a:rPr lang="en-US" dirty="0" smtClean="0"/>
+              <a:t>Dataset</a:t>
+            </a:r>
+          </a:p>
+          <a:p>
+            <a:endParaRPr lang="en-SG" dirty="0"/>
+          </a:p>
+        </p:txBody>
+      </p:sp>
+      <p:sp>
+        <p:nvSpPr>
+          <p:cNvPr id="4" name="Slide Number Placeholder 3"/>
+          <p:cNvSpPr>
+            <a:spLocks noGrp="1"/>
+          </p:cNvSpPr>
+          <p:nvPr>
+            <p:ph type="sldNum" sz="quarter" idx="4"/>
+          </p:nvPr>
+        </p:nvSpPr>
+        <p:spPr/>
+        <p:txBody>
+          <a:bodyPr/>
+          <a:lstStyle/>
+          <a:p>
+            <a:r>
+              <a:rPr lang="en-SG" smtClean="0"/>
+              <a:t>Page </a:t>
+            </a:r>
+            <a:fld id="{2F63C605-4FC6-46DE-BC90-871762EA3F52}" type="slidenum">
+              <a:rPr lang="en-SG" smtClean="0"/>
+              <a:pPr/>
+              <a:t>10</a:t>
+            </a:fld>
+            <a:endParaRPr lang="en-SG" dirty="0"/>
+          </a:p>
+        </p:txBody>
+      </p:sp>
+      <p:pic>
+        <p:nvPicPr>
+          <p:cNvPr id="7" name="Picture 6"/>
+          <p:cNvPicPr>
+            <a:picLocks noChangeAspect="1"/>
+          </p:cNvPicPr>
+          <p:nvPr/>
+        </p:nvPicPr>
+        <p:blipFill>
+          <a:blip r:embed="rId2"/>
+          <a:stretch>
+            <a:fillRect/>
+          </a:stretch>
+        </p:blipFill>
+        <p:spPr>
+          <a:xfrm>
+            <a:off x="611477" y="1978864"/>
+            <a:ext cx="7921046" cy="2767516"/>
+          </a:xfrm>
+          <a:prstGeom prst="rect">
+            <a:avLst/>
+          </a:prstGeom>
+        </p:spPr>
+      </p:pic>
+    </p:spTree>
+    <p:extLst>
+      <p:ext uri="{BB962C8B-B14F-4D97-AF65-F5344CB8AC3E}">
+        <p14:creationId xmlns:p14="http://schemas.microsoft.com/office/powerpoint/2010/main" val="2013395065"/>
+      </p:ext>
+    </p:extLst>
+  </p:cSld>
+  <p:clrMapOvr>
+    <a:masterClrMapping/>
+  </p:clrMapOvr>
+</p:sld>
+</file>
+
+<file path=ppt/slides/slide11.xml><?xml version="1.0" encoding="utf-8"?>
+<p:sld xmlns:a="http://schemas.openxmlformats.org/drawingml/2006/main" xmlns:r="http://schemas.openxmlformats.org/officeDocument/2006/relationships" xmlns:p="http://schemas.openxmlformats.org/presentationml/2006/main">
+  <p:cSld>
+    <p:spTree>
+      <p:nvGrpSpPr>
+        <p:cNvPr id="1" name=""/>
+        <p:cNvGrpSpPr/>
+        <p:nvPr/>
+      </p:nvGrpSpPr>
+      <p:grpSpPr>
+        <a:xfrm>
+          <a:off x="0" y="0"/>
+          <a:ext cx="0" cy="0"/>
+          <a:chOff x="0" y="0"/>
+          <a:chExt cx="0" cy="0"/>
+        </a:xfrm>
+      </p:grpSpPr>
+      <p:sp>
+        <p:nvSpPr>
+          <p:cNvPr id="2" name="Title 1"/>
+          <p:cNvSpPr>
+            <a:spLocks noGrp="1"/>
+          </p:cNvSpPr>
+          <p:nvPr>
+            <p:ph type="title"/>
+          </p:nvPr>
+        </p:nvSpPr>
+        <p:spPr/>
+        <p:txBody>
           <a:bodyPr>
             <a:normAutofit/>
           </a:bodyPr>
@@ -3806,7 +3937,7 @@
             <a:fld id="{2F63C605-4FC6-46DE-BC90-871762EA3F52}" type="slidenum">
               <a:rPr lang="en-SG" smtClean="0"/>
               <a:pPr/>
-              <a:t>10</a:t>
+              <a:t>11</a:t>
             </a:fld>
             <a:endParaRPr lang="en-SG" dirty="0"/>
           </a:p>
@@ -3832,7 +3963,7 @@
 </p:sld>
 </file>
 
-<file path=ppt/slides/slide11.xml><?xml version="1.0" encoding="utf-8"?>
+<file path=ppt/slides/slide12.xml><?xml version="1.0" encoding="utf-8"?>
 <p:sld xmlns:a="http://schemas.openxmlformats.org/drawingml/2006/main" xmlns:r="http://schemas.openxmlformats.org/officeDocument/2006/relationships" xmlns:p="http://schemas.openxmlformats.org/presentationml/2006/main">
   <p:cSld>
     <p:spTree>
@@ -3913,7 +4044,7 @@
             <a:fld id="{2F63C605-4FC6-46DE-BC90-871762EA3F52}" type="slidenum">
               <a:rPr lang="en-SG" smtClean="0"/>
               <a:pPr/>
-              <a:t>11</a:t>
+              <a:t>12</a:t>
             </a:fld>
             <a:endParaRPr lang="en-SG" dirty="0"/>
           </a:p>
@@ -4480,7 +4611,7 @@
       </p:sp>
       <p:pic>
         <p:nvPicPr>
-          <p:cNvPr id="5" name="Picture 4"/>
+          <p:cNvPr id="7" name="Picture 6"/>
           <p:cNvPicPr>
             <a:picLocks noChangeAspect="1"/>
           </p:cNvPicPr>
@@ -4494,8 +4625,8 @@
         </p:blipFill>
         <p:spPr>
           <a:xfrm>
-            <a:off x="1367463" y="3899833"/>
-            <a:ext cx="6631228" cy="1781204"/>
+            <a:off x="5375173" y="3646842"/>
+            <a:ext cx="1623012" cy="2524685"/>
           </a:xfrm>
           <a:prstGeom prst="rect">
             <a:avLst/>
@@ -4737,15 +4868,7 @@
             <a:pPr lvl="1"/>
             <a:r>
               <a:rPr lang="en-US" dirty="0" smtClean="0"/>
-              <a:t>Obtained during </a:t>
-            </a:r>
-            <a:r>
-              <a:rPr lang="en-US" dirty="0" smtClean="0"/>
-              <a:t>burn-in test interval </a:t>
-            </a:r>
-            <a:r>
-              <a:rPr lang="en-US" dirty="0" smtClean="0"/>
-              <a:t>under similar testing environment</a:t>
+              <a:t>Obtained during burn-in test interval under similar testing environment</a:t>
             </a:r>
           </a:p>
           <a:p>
@@ -4989,7 +5112,11 @@
           <a:bodyPr/>
           <a:lstStyle/>
           <a:p>
-            <a:endParaRPr lang="en-SG"/>
+            <a:r>
+              <a:rPr lang="en-US" dirty="0" smtClean="0"/>
+              <a:t>Resource</a:t>
+            </a:r>
+            <a:endParaRPr lang="en-SG" dirty="0"/>
           </a:p>
         </p:txBody>
       </p:sp>

</xml_diff>